<commit_message>
ISS-46: Fix reading group TextFrame
</commit_message>
<xml_diff>
--- a/test/SlideXML.Tests/Resource/011_dt.pptx
+++ b/test/SlideXML.Tests/Resource/011_dt.pptx
@@ -375,7 +375,7 @@
               <a:pPr>
                 <a:defRPr/>
               </a:pPr>
-              <a:t>1/30/2020</a:t>
+              <a:t>2/1/2020</a:t>
             </a:fld>
             <a:endParaRPr lang="en-US" dirty="0"/>
           </a:p>
@@ -619,7 +619,7 @@
               <a:pPr>
                 <a:defRPr/>
               </a:pPr>
-              <a:t>1/30/2020</a:t>
+              <a:t>2/1/2020</a:t>
             </a:fld>
             <a:endParaRPr lang="en-US" dirty="0"/>
           </a:p>
@@ -1013,7 +1013,7 @@
           <a:graphicData uri="http://schemas.openxmlformats.org/presentationml/2006/ole">
             <mc:AlternateContent xmlns:mc="http://schemas.openxmlformats.org/markup-compatibility/2006">
               <mc:Choice xmlns:v="urn:schemas-microsoft-com:vml" Requires="v">
-                <p:oleObj spid="_x0000_s83987" name="think-cell Slide" r:id="rId8" imgW="360" imgH="360" progId="TCLayout.ActiveDocument.1">
+                <p:oleObj spid="_x0000_s83988" name="think-cell Slide" r:id="rId8" imgW="360" imgH="360" progId="TCLayout.ActiveDocument.1">
                   <p:embed/>
                 </p:oleObj>
               </mc:Choice>
@@ -1455,7 +1455,7 @@
           <a:graphicData uri="http://schemas.openxmlformats.org/presentationml/2006/ole">
             <mc:AlternateContent xmlns:mc="http://schemas.openxmlformats.org/markup-compatibility/2006">
               <mc:Choice xmlns:v="urn:schemas-microsoft-com:vml" Requires="v">
-                <p:oleObj spid="_x0000_s1049" name="think-cell Slide" r:id="rId5" imgW="360" imgH="360" progId="TCLayout.ActiveDocument.1">
+                <p:oleObj spid="_x0000_s1050" name="think-cell Slide" r:id="rId5" imgW="360" imgH="360" progId="TCLayout.ActiveDocument.1">
                   <p:embed/>
                 </p:oleObj>
               </mc:Choice>
@@ -2315,6 +2315,143 @@
           </a:p>
         </p:txBody>
       </p:sp>
+      <p:grpSp>
+        <p:nvGrpSpPr>
+          <p:cNvPr id="4" name="Группа 3">
+            <a:extLst>
+              <a:ext uri="{FF2B5EF4-FFF2-40B4-BE49-F238E27FC236}">
+                <a16:creationId xmlns:a16="http://schemas.microsoft.com/office/drawing/2014/main" id="{C66969F1-A2BA-4DA4-9F4D-69D9B96EAA49}"/>
+              </a:ext>
+            </a:extLst>
+          </p:cNvPr>
+          <p:cNvGrpSpPr/>
+          <p:nvPr/>
+        </p:nvGrpSpPr>
+        <p:grpSpPr>
+          <a:xfrm>
+            <a:off x="2267744" y="476672"/>
+            <a:ext cx="1080120" cy="936104"/>
+            <a:chOff x="3779912" y="908720"/>
+            <a:chExt cx="1080120" cy="936104"/>
+          </a:xfrm>
+        </p:grpSpPr>
+        <p:sp>
+          <p:nvSpPr>
+            <p:cNvPr id="3" name="TextBox 2">
+              <a:extLst>
+                <a:ext uri="{FF2B5EF4-FFF2-40B4-BE49-F238E27FC236}">
+                  <a16:creationId xmlns:a16="http://schemas.microsoft.com/office/drawing/2014/main" id="{374D6F53-8B5B-4186-A746-88975B8B3BF7}"/>
+                </a:ext>
+              </a:extLst>
+            </p:cNvPr>
+            <p:cNvSpPr txBox="1"/>
+            <p:nvPr/>
+          </p:nvSpPr>
+          <p:spPr>
+            <a:xfrm>
+              <a:off x="3779912" y="908720"/>
+              <a:ext cx="1080120" cy="360040"/>
+            </a:xfrm>
+            <a:prstGeom prst="rect">
+              <a:avLst/>
+            </a:prstGeom>
+          </p:spPr>
+          <p:style>
+            <a:lnRef idx="2">
+              <a:schemeClr val="accent3"/>
+            </a:lnRef>
+            <a:fillRef idx="1">
+              <a:schemeClr val="lt1"/>
+            </a:fillRef>
+            <a:effectRef idx="0">
+              <a:schemeClr val="accent3"/>
+            </a:effectRef>
+            <a:fontRef idx="minor">
+              <a:schemeClr val="dk1"/>
+            </a:fontRef>
+          </p:style>
+          <p:txBody>
+            <a:bodyPr vert="horz" wrap="square" lIns="0" tIns="0" rIns="0" bIns="0" rtlCol="0">
+              <a:noAutofit/>
+            </a:bodyPr>
+            <a:lstStyle/>
+            <a:p>
+              <a:pPr indent="-274320">
+                <a:spcAft>
+                  <a:spcPts val="900"/>
+                </a:spcAft>
+              </a:pPr>
+              <a:r>
+                <a:rPr lang="en-US" sz="2000" dirty="0">
+                  <a:latin typeface="Georgia" pitchFamily="18" charset="0"/>
+                </a:rPr>
+                <a:t>ch1</a:t>
+              </a:r>
+              <a:endParaRPr lang="ru-UA" sz="2000" dirty="0" err="1">
+                <a:latin typeface="Georgia" pitchFamily="18" charset="0"/>
+              </a:endParaRPr>
+            </a:p>
+          </p:txBody>
+        </p:sp>
+        <p:sp>
+          <p:nvSpPr>
+            <p:cNvPr id="5" name="TextBox 4">
+              <a:extLst>
+                <a:ext uri="{FF2B5EF4-FFF2-40B4-BE49-F238E27FC236}">
+                  <a16:creationId xmlns:a16="http://schemas.microsoft.com/office/drawing/2014/main" id="{E958E184-BB40-418A-973A-8B4731690AA9}"/>
+                </a:ext>
+              </a:extLst>
+            </p:cNvPr>
+            <p:cNvSpPr txBox="1"/>
+            <p:nvPr/>
+          </p:nvSpPr>
+          <p:spPr>
+            <a:xfrm>
+              <a:off x="3779912" y="1484784"/>
+              <a:ext cx="1080120" cy="360040"/>
+            </a:xfrm>
+            <a:prstGeom prst="rect">
+              <a:avLst/>
+            </a:prstGeom>
+          </p:spPr>
+          <p:style>
+            <a:lnRef idx="2">
+              <a:schemeClr val="accent3"/>
+            </a:lnRef>
+            <a:fillRef idx="1">
+              <a:schemeClr val="lt1"/>
+            </a:fillRef>
+            <a:effectRef idx="0">
+              <a:schemeClr val="accent3"/>
+            </a:effectRef>
+            <a:fontRef idx="minor">
+              <a:schemeClr val="dk1"/>
+            </a:fontRef>
+          </p:style>
+          <p:txBody>
+            <a:bodyPr vert="horz" wrap="square" lIns="0" tIns="0" rIns="0" bIns="0" rtlCol="0">
+              <a:noAutofit/>
+            </a:bodyPr>
+            <a:lstStyle/>
+            <a:p>
+              <a:pPr indent="-274320">
+                <a:spcAft>
+                  <a:spcPts val="900"/>
+                </a:spcAft>
+              </a:pPr>
+              <a:r>
+                <a:rPr lang="en-US" sz="2000" dirty="0">
+                  <a:latin typeface="Georgia" pitchFamily="18" charset="0"/>
+                </a:rPr>
+                <a:t>ch2</a:t>
+              </a:r>
+              <a:endParaRPr lang="ru-UA" sz="2000" dirty="0" err="1">
+                <a:latin typeface="Georgia" pitchFamily="18" charset="0"/>
+              </a:endParaRPr>
+            </a:p>
+          </p:txBody>
+        </p:sp>
+      </p:grpSp>
     </p:spTree>
     <p:extLst>
       <p:ext uri="{BB962C8B-B14F-4D97-AF65-F5344CB8AC3E}">

</xml_diff>